<commit_message>
Just syncing things up
</commit_message>
<xml_diff>
--- a/project_graphics.pptx
+++ b/project_graphics.pptx
@@ -6,6 +6,9 @@
   </p:sldMasterIdLst>
   <p:sldIdLst>
     <p:sldId id="256" r:id="rId2"/>
+    <p:sldId id="257" r:id="rId3"/>
+    <p:sldId id="258" r:id="rId4"/>
+    <p:sldId id="259" r:id="rId5"/>
   </p:sldIdLst>
   <p:sldSz cx="12192000" cy="6858000"/>
   <p:notesSz cx="6858000" cy="9144000"/>
@@ -104,6 +107,11 @@
       </a:defRPr>
     </a:lvl9pPr>
   </p:defaultTextStyle>
+  <p:extLst>
+    <p:ext uri="{EFAFB233-063F-42B5-8137-9DF3F51BA10A}">
+      <p15:sldGuideLst xmlns:p15="http://schemas.microsoft.com/office/powerpoint/2012/main"/>
+    </p:ext>
+  </p:extLst>
 </p:presentation>
 </file>
 
@@ -3342,8 +3350,8 @@
           <a:chExt cx="0" cy="0"/>
         </a:xfrm>
       </p:grpSpPr>
-      <mc:AlternateContent xmlns:mc="http://schemas.openxmlformats.org/markup-compatibility/2006">
-        <mc:Choice xmlns:a14="http://schemas.microsoft.com/office/drawing/2010/main" Requires="a14">
+      <mc:AlternateContent xmlns:mc="http://schemas.openxmlformats.org/markup-compatibility/2006" xmlns:a14="http://schemas.microsoft.com/office/drawing/2010/main">
+        <mc:Choice Requires="a14">
           <p:sp>
             <p:nvSpPr>
               <p:cNvPr id="4" name="TextBox 3">
@@ -3372,6 +3380,7 @@
               </a:bodyPr>
               <a:lstStyle/>
               <a:p>
+                <a:pPr/>
                 <a14:m>
                   <m:oMathPara xmlns:m="http://schemas.openxmlformats.org/officeDocument/2006/math">
                     <m:oMathParaPr>
@@ -3383,7 +3392,9 @@
                           <m:begChr m:val="["/>
                           <m:endChr m:val="]"/>
                           <m:ctrlPr>
-                            <a:rPr lang="en-CA" i="1" smtClean="0"/>
+                            <a:rPr lang="en-CA" i="1" smtClean="0">
+                              <a:latin typeface="Cambria Math" panose="02040503050406030204" pitchFamily="18" charset="0"/>
+                            </a:rPr>
                           </m:ctrlPr>
                         </m:dPr>
                         <m:e>
@@ -3398,7 +3409,9 @@
                                 </m:mc>
                               </m:mcs>
                               <m:ctrlPr>
-                                <a:rPr lang="en-CA" i="1" smtClean="0"/>
+                                <a:rPr lang="en-CA" i="1" smtClean="0">
+                                  <a:latin typeface="Cambria Math" panose="02040503050406030204" pitchFamily="18" charset="0"/>
+                                </a:rPr>
                               </m:ctrlPr>
                             </m:mPr>
                             <m:mr>
@@ -3413,7 +3426,9 @@
                               </m:e>
                               <m:e>
                                 <m:r>
-                                  <a:rPr lang="en-CA" i="1" smtClean="0"/>
+                                  <a:rPr lang="en-CA" i="1" smtClean="0">
+                                    <a:latin typeface="Cambria Math" panose="02040503050406030204" pitchFamily="18" charset="0"/>
+                                  </a:rPr>
                                   <m:t>⋯</m:t>
                                 </m:r>
                               </m:e>
@@ -3445,7 +3460,9 @@
                               </m:e>
                               <m:e>
                                 <m:r>
-                                  <a:rPr lang="en-CA" i="1" smtClean="0"/>
+                                  <a:rPr lang="en-CA" i="1" smtClean="0">
+                                    <a:latin typeface="Cambria Math" panose="02040503050406030204" pitchFamily="18" charset="0"/>
+                                  </a:rPr>
                                   <m:t>⋯</m:t>
                                 </m:r>
                               </m:e>
@@ -3462,13 +3479,17 @@
                             <m:mr>
                               <m:e>
                                 <m:r>
-                                  <a:rPr lang="en-CA" b="0" i="1" smtClean="0"/>
+                                  <a:rPr lang="en-CA" b="0" i="1" smtClean="0">
+                                    <a:latin typeface="Cambria Math" panose="02040503050406030204" pitchFamily="18" charset="0"/>
+                                  </a:rPr>
                                   <m:t>0</m:t>
                                 </m:r>
                               </m:e>
                               <m:e>
                                 <m:r>
-                                  <a:rPr lang="en-CA" i="1" smtClean="0"/>
+                                  <a:rPr lang="en-CA" i="1" smtClean="0">
+                                    <a:latin typeface="Cambria Math" panose="02040503050406030204" pitchFamily="18" charset="0"/>
+                                  </a:rPr>
                                   <m:t>⋯</m:t>
                                 </m:r>
                               </m:e>
@@ -3485,13 +3506,17 @@
                             <m:mr>
                               <m:e>
                                 <m:r>
-                                  <a:rPr lang="en-CA" b="0" i="1" smtClean="0"/>
+                                  <a:rPr lang="en-CA" b="0" i="1" smtClean="0">
+                                    <a:latin typeface="Cambria Math" panose="02040503050406030204" pitchFamily="18" charset="0"/>
+                                  </a:rPr>
                                   <m:t>0</m:t>
                                 </m:r>
                               </m:e>
                               <m:e>
                                 <m:r>
-                                  <a:rPr lang="en-CA" i="1" smtClean="0"/>
+                                  <a:rPr lang="en-CA" i="1" smtClean="0">
+                                    <a:latin typeface="Cambria Math" panose="02040503050406030204" pitchFamily="18" charset="0"/>
+                                  </a:rPr>
                                   <m:t>⋯</m:t>
                                 </m:r>
                               </m:e>
@@ -3508,13 +3533,17 @@
                             <m:mr>
                               <m:e>
                                 <m:r>
-                                  <a:rPr lang="en-CA" b="0" i="1" smtClean="0"/>
+                                  <a:rPr lang="en-CA" b="0" i="1" smtClean="0">
+                                    <a:latin typeface="Cambria Math" panose="02040503050406030204" pitchFamily="18" charset="0"/>
+                                  </a:rPr>
                                   <m:t>0</m:t>
                                 </m:r>
                               </m:e>
                               <m:e>
                                 <m:r>
-                                  <a:rPr lang="en-CA" i="1" smtClean="0"/>
+                                  <a:rPr lang="en-CA" i="1" smtClean="0">
+                                    <a:latin typeface="Cambria Math" panose="02040503050406030204" pitchFamily="18" charset="0"/>
+                                  </a:rPr>
                                   <m:t>⋯</m:t>
                                 </m:r>
                               </m:e>
@@ -3531,13 +3560,17 @@
                             <m:mr>
                               <m:e>
                                 <m:r>
-                                  <a:rPr lang="en-CA" b="0" i="1" smtClean="0"/>
+                                  <a:rPr lang="en-CA" b="0" i="1" smtClean="0">
+                                    <a:latin typeface="Cambria Math" panose="02040503050406030204" pitchFamily="18" charset="0"/>
+                                  </a:rPr>
                                   <m:t>0</m:t>
                                 </m:r>
                               </m:e>
                               <m:e>
                                 <m:r>
-                                  <a:rPr lang="en-CA" i="1" smtClean="0"/>
+                                  <a:rPr lang="en-CA" i="1" smtClean="0">
+                                    <a:latin typeface="Cambria Math" panose="02040503050406030204" pitchFamily="18" charset="0"/>
+                                  </a:rPr>
                                   <m:t>⋯</m:t>
                                 </m:r>
                               </m:e>
@@ -3554,13 +3587,17 @@
                             <m:mr>
                               <m:e>
                                 <m:r>
-                                  <a:rPr lang="en-CA" b="0" i="1" smtClean="0"/>
+                                  <a:rPr lang="en-CA" b="0" i="1" smtClean="0">
+                                    <a:latin typeface="Cambria Math" panose="02040503050406030204" pitchFamily="18" charset="0"/>
+                                  </a:rPr>
                                   <m:t>0</m:t>
                                 </m:r>
                               </m:e>
                               <m:e>
                                 <m:r>
-                                  <a:rPr lang="en-CA" i="1" smtClean="0"/>
+                                  <a:rPr lang="en-CA" i="1" smtClean="0">
+                                    <a:latin typeface="Cambria Math" panose="02040503050406030204" pitchFamily="18" charset="0"/>
+                                  </a:rPr>
                                   <m:t>⋯</m:t>
                                 </m:r>
                               </m:e>
@@ -3577,13 +3614,17 @@
                             <m:mr>
                               <m:e>
                                 <m:r>
-                                  <a:rPr lang="en-CA" b="0" i="1" smtClean="0"/>
+                                  <a:rPr lang="en-CA" b="0" i="1" smtClean="0">
+                                    <a:latin typeface="Cambria Math" panose="02040503050406030204" pitchFamily="18" charset="0"/>
+                                  </a:rPr>
                                   <m:t>0</m:t>
                                 </m:r>
                               </m:e>
                               <m:e>
                                 <m:r>
-                                  <a:rPr lang="en-CA" i="1" smtClean="0"/>
+                                  <a:rPr lang="en-CA" i="1" smtClean="0">
+                                    <a:latin typeface="Cambria Math" panose="02040503050406030204" pitchFamily="18" charset="0"/>
+                                  </a:rPr>
                                   <m:t>⋯</m:t>
                                 </m:r>
                               </m:e>
@@ -3600,13 +3641,17 @@
                             <m:mr>
                               <m:e>
                                 <m:r>
-                                  <a:rPr lang="en-CA" b="0" i="1" smtClean="0"/>
+                                  <a:rPr lang="en-CA" b="0" i="1" smtClean="0">
+                                    <a:latin typeface="Cambria Math" panose="02040503050406030204" pitchFamily="18" charset="0"/>
+                                  </a:rPr>
                                   <m:t>0</m:t>
                                 </m:r>
                               </m:e>
                               <m:e>
                                 <m:r>
-                                  <a:rPr lang="en-CA" i="1" smtClean="0"/>
+                                  <a:rPr lang="en-CA" i="1" smtClean="0">
+                                    <a:latin typeface="Cambria Math" panose="02040503050406030204" pitchFamily="18" charset="0"/>
+                                  </a:rPr>
                                   <m:t>⋯</m:t>
                                 </m:r>
                               </m:e>
@@ -3623,13 +3668,17 @@
                             <m:mr>
                               <m:e>
                                 <m:r>
-                                  <a:rPr lang="en-CA" b="0" i="1" smtClean="0"/>
+                                  <a:rPr lang="en-CA" b="0" i="1" smtClean="0">
+                                    <a:latin typeface="Cambria Math" panose="02040503050406030204" pitchFamily="18" charset="0"/>
+                                  </a:rPr>
                                   <m:t>0</m:t>
                                 </m:r>
                               </m:e>
                               <m:e>
                                 <m:r>
-                                  <a:rPr lang="en-CA" i="1" smtClean="0"/>
+                                  <a:rPr lang="en-CA" i="1" smtClean="0">
+                                    <a:latin typeface="Cambria Math" panose="02040503050406030204" pitchFamily="18" charset="0"/>
+                                  </a:rPr>
                                   <m:t>⋯</m:t>
                                 </m:r>
                               </m:e>
@@ -3646,13 +3695,17 @@
                             <m:mr>
                               <m:e>
                                 <m:r>
-                                  <a:rPr lang="en-CA" b="0" i="1" smtClean="0"/>
+                                  <a:rPr lang="en-CA" b="0" i="1" smtClean="0">
+                                    <a:latin typeface="Cambria Math" panose="02040503050406030204" pitchFamily="18" charset="0"/>
+                                  </a:rPr>
                                   <m:t>0</m:t>
                                 </m:r>
                               </m:e>
                               <m:e>
                                 <m:r>
-                                  <a:rPr lang="en-CA" i="1" smtClean="0"/>
+                                  <a:rPr lang="en-CA" i="1" smtClean="0">
+                                    <a:latin typeface="Cambria Math" panose="02040503050406030204" pitchFamily="18" charset="0"/>
+                                  </a:rPr>
                                   <m:t>⋯</m:t>
                                 </m:r>
                               </m:e>
@@ -3669,13 +3722,17 @@
                             <m:mr>
                               <m:e>
                                 <m:r>
-                                  <a:rPr lang="en-CA" b="0" i="1" smtClean="0"/>
+                                  <a:rPr lang="en-CA" b="0" i="1" smtClean="0">
+                                    <a:latin typeface="Cambria Math" panose="02040503050406030204" pitchFamily="18" charset="0"/>
+                                  </a:rPr>
                                   <m:t>0</m:t>
                                 </m:r>
                               </m:e>
                               <m:e>
                                 <m:r>
-                                  <a:rPr lang="en-CA" i="1" smtClean="0"/>
+                                  <a:rPr lang="en-CA" i="1" smtClean="0">
+                                    <a:latin typeface="Cambria Math" panose="02040503050406030204" pitchFamily="18" charset="0"/>
+                                  </a:rPr>
                                   <m:t>⋯</m:t>
                                 </m:r>
                               </m:e>
@@ -3692,13 +3749,17 @@
                             <m:mr>
                               <m:e>
                                 <m:r>
-                                  <a:rPr lang="en-CA" b="0" i="1" smtClean="0"/>
+                                  <a:rPr lang="en-CA" b="0" i="1" smtClean="0">
+                                    <a:latin typeface="Cambria Math" panose="02040503050406030204" pitchFamily="18" charset="0"/>
+                                  </a:rPr>
                                   <m:t>0</m:t>
                                 </m:r>
                               </m:e>
                               <m:e>
                                 <m:r>
-                                  <a:rPr lang="en-CA" i="1" smtClean="0"/>
+                                  <a:rPr lang="en-CA" i="1" smtClean="0">
+                                    <a:latin typeface="Cambria Math" panose="02040503050406030204" pitchFamily="18" charset="0"/>
+                                  </a:rPr>
                                   <m:t>⋯</m:t>
                                 </m:r>
                               </m:e>
@@ -3715,19 +3776,25 @@
                             <m:mr>
                               <m:e>
                                 <m:r>
-                                  <a:rPr lang="en-CA" b="0" i="1" smtClean="0"/>
+                                  <a:rPr lang="en-CA" b="0" i="1" smtClean="0">
+                                    <a:latin typeface="Cambria Math" panose="02040503050406030204" pitchFamily="18" charset="0"/>
+                                  </a:rPr>
                                   <m:t>0</m:t>
                                 </m:r>
                               </m:e>
                               <m:e>
                                 <m:r>
-                                  <a:rPr lang="en-CA" i="1" smtClean="0"/>
+                                  <a:rPr lang="en-CA" i="1" smtClean="0">
+                                    <a:latin typeface="Cambria Math" panose="02040503050406030204" pitchFamily="18" charset="0"/>
+                                  </a:rPr>
                                   <m:t>⋯</m:t>
                                 </m:r>
                               </m:e>
                               <m:e>
                                 <m:r>
-                                  <a:rPr lang="en-CA" b="0" i="1" smtClean="0"/>
+                                  <a:rPr lang="en-CA" b="0" i="1" smtClean="0">
+                                    <a:latin typeface="Cambria Math" panose="02040503050406030204" pitchFamily="18" charset="0"/>
+                                  </a:rPr>
                                   <m:t>1</m:t>
                                 </m:r>
                               </m:e>
@@ -3743,7 +3810,7 @@
             </p:txBody>
           </p:sp>
         </mc:Choice>
-        <mc:Fallback>
+        <mc:Fallback xmlns="">
           <p:sp>
             <p:nvSpPr>
               <p:cNvPr id="4" name="TextBox 3">
@@ -3788,8 +3855,8 @@
           </p:sp>
         </mc:Fallback>
       </mc:AlternateContent>
-      <mc:AlternateContent xmlns:mc="http://schemas.openxmlformats.org/markup-compatibility/2006">
-        <mc:Choice xmlns:a14="http://schemas.microsoft.com/office/drawing/2010/main" Requires="a14">
+      <mc:AlternateContent xmlns:mc="http://schemas.openxmlformats.org/markup-compatibility/2006" xmlns:a14="http://schemas.microsoft.com/office/drawing/2010/main">
+        <mc:Choice Requires="a14">
           <p:sp>
             <p:nvSpPr>
               <p:cNvPr id="7" name="TextBox 6">
@@ -3818,6 +3885,7 @@
               </a:bodyPr>
               <a:lstStyle/>
               <a:p>
+                <a:pPr/>
                 <a14:m>
                   <m:oMathPara xmlns:m="http://schemas.openxmlformats.org/officeDocument/2006/math">
                     <m:oMathParaPr>
@@ -3829,7 +3897,9 @@
                           <m:begChr m:val="["/>
                           <m:endChr m:val="]"/>
                           <m:ctrlPr>
-                            <a:rPr lang="en-CA" i="1" smtClean="0"/>
+                            <a:rPr lang="en-CA" i="1" smtClean="0">
+                              <a:latin typeface="Cambria Math" panose="02040503050406030204" pitchFamily="18" charset="0"/>
+                            </a:rPr>
                           </m:ctrlPr>
                         </m:dPr>
                         <m:e>
@@ -3844,7 +3914,9 @@
                                 </m:mc>
                               </m:mcs>
                               <m:ctrlPr>
-                                <a:rPr lang="en-CA" i="1" smtClean="0"/>
+                                <a:rPr lang="en-CA" i="1" smtClean="0">
+                                  <a:latin typeface="Cambria Math" panose="02040503050406030204" pitchFamily="18" charset="0"/>
+                                </a:rPr>
                               </m:ctrlPr>
                             </m:mPr>
                             <m:mr>
@@ -3859,7 +3931,9 @@
                               </m:e>
                               <m:e>
                                 <m:r>
-                                  <a:rPr lang="en-CA" i="1" smtClean="0"/>
+                                  <a:rPr lang="en-CA" i="1" smtClean="0">
+                                    <a:latin typeface="Cambria Math" panose="02040503050406030204" pitchFamily="18" charset="0"/>
+                                  </a:rPr>
                                   <m:t>⋯</m:t>
                                 </m:r>
                               </m:e>
@@ -3884,7 +3958,9 @@
                               </m:e>
                               <m:e>
                                 <m:r>
-                                  <a:rPr lang="en-CA" i="1" smtClean="0"/>
+                                  <a:rPr lang="en-CA" i="1" smtClean="0">
+                                    <a:latin typeface="Cambria Math" panose="02040503050406030204" pitchFamily="18" charset="0"/>
+                                  </a:rPr>
                                   <m:t>⋯</m:t>
                                 </m:r>
                               </m:e>
@@ -3901,13 +3977,17 @@
                             <m:mr>
                               <m:e>
                                 <m:r>
-                                  <a:rPr lang="en-CA" b="0" i="1" smtClean="0"/>
+                                  <a:rPr lang="en-CA" b="0" i="1" smtClean="0">
+                                    <a:latin typeface="Cambria Math" panose="02040503050406030204" pitchFamily="18" charset="0"/>
+                                  </a:rPr>
                                   <m:t>0</m:t>
                                 </m:r>
                               </m:e>
                               <m:e>
                                 <m:r>
-                                  <a:rPr lang="en-CA" i="1" smtClean="0"/>
+                                  <a:rPr lang="en-CA" i="1" smtClean="0">
+                                    <a:latin typeface="Cambria Math" panose="02040503050406030204" pitchFamily="18" charset="0"/>
+                                  </a:rPr>
                                   <m:t>⋯</m:t>
                                 </m:r>
                               </m:e>
@@ -3924,13 +4004,17 @@
                             <m:mr>
                               <m:e>
                                 <m:r>
-                                  <a:rPr lang="en-CA" b="0" i="1" smtClean="0"/>
+                                  <a:rPr lang="en-CA" b="0" i="1" smtClean="0">
+                                    <a:latin typeface="Cambria Math" panose="02040503050406030204" pitchFamily="18" charset="0"/>
+                                  </a:rPr>
                                   <m:t>0</m:t>
                                 </m:r>
                               </m:e>
                               <m:e>
                                 <m:r>
-                                  <a:rPr lang="en-CA" i="1" smtClean="0"/>
+                                  <a:rPr lang="en-CA" i="1" smtClean="0">
+                                    <a:latin typeface="Cambria Math" panose="02040503050406030204" pitchFamily="18" charset="0"/>
+                                  </a:rPr>
                                   <m:t>⋯</m:t>
                                 </m:r>
                               </m:e>
@@ -3947,13 +4031,17 @@
                             <m:mr>
                               <m:e>
                                 <m:r>
-                                  <a:rPr lang="en-CA" b="0" i="1" smtClean="0"/>
+                                  <a:rPr lang="en-CA" b="0" i="1" smtClean="0">
+                                    <a:latin typeface="Cambria Math" panose="02040503050406030204" pitchFamily="18" charset="0"/>
+                                  </a:rPr>
                                   <m:t>0</m:t>
                                 </m:r>
                               </m:e>
                               <m:e>
                                 <m:r>
-                                  <a:rPr lang="en-CA" i="1" smtClean="0"/>
+                                  <a:rPr lang="en-CA" i="1" smtClean="0">
+                                    <a:latin typeface="Cambria Math" panose="02040503050406030204" pitchFamily="18" charset="0"/>
+                                  </a:rPr>
                                   <m:t>⋯</m:t>
                                 </m:r>
                               </m:e>
@@ -3970,13 +4058,17 @@
                             <m:mr>
                               <m:e>
                                 <m:r>
-                                  <a:rPr lang="en-CA" b="0" i="1" smtClean="0"/>
+                                  <a:rPr lang="en-CA" b="0" i="1" smtClean="0">
+                                    <a:latin typeface="Cambria Math" panose="02040503050406030204" pitchFamily="18" charset="0"/>
+                                  </a:rPr>
                                   <m:t>0</m:t>
                                 </m:r>
                               </m:e>
                               <m:e>
                                 <m:r>
-                                  <a:rPr lang="en-CA" i="1" smtClean="0"/>
+                                  <a:rPr lang="en-CA" i="1" smtClean="0">
+                                    <a:latin typeface="Cambria Math" panose="02040503050406030204" pitchFamily="18" charset="0"/>
+                                  </a:rPr>
                                   <m:t>⋯</m:t>
                                 </m:r>
                               </m:e>
@@ -3993,13 +4085,17 @@
                             <m:mr>
                               <m:e>
                                 <m:r>
-                                  <a:rPr lang="en-CA" b="0" i="1" smtClean="0"/>
+                                  <a:rPr lang="en-CA" b="0" i="1" smtClean="0">
+                                    <a:latin typeface="Cambria Math" panose="02040503050406030204" pitchFamily="18" charset="0"/>
+                                  </a:rPr>
                                   <m:t>0</m:t>
                                 </m:r>
                               </m:e>
                               <m:e>
                                 <m:r>
-                                  <a:rPr lang="en-CA" i="1" smtClean="0"/>
+                                  <a:rPr lang="en-CA" i="1" smtClean="0">
+                                    <a:latin typeface="Cambria Math" panose="02040503050406030204" pitchFamily="18" charset="0"/>
+                                  </a:rPr>
                                   <m:t>⋯</m:t>
                                 </m:r>
                               </m:e>
@@ -4016,13 +4112,17 @@
                             <m:mr>
                               <m:e>
                                 <m:r>
-                                  <a:rPr lang="en-CA" b="0" i="1" smtClean="0"/>
+                                  <a:rPr lang="en-CA" b="0" i="1" smtClean="0">
+                                    <a:latin typeface="Cambria Math" panose="02040503050406030204" pitchFamily="18" charset="0"/>
+                                  </a:rPr>
                                   <m:t>0</m:t>
                                 </m:r>
                               </m:e>
                               <m:e>
                                 <m:r>
-                                  <a:rPr lang="en-CA" i="1" smtClean="0"/>
+                                  <a:rPr lang="en-CA" i="1" smtClean="0">
+                                    <a:latin typeface="Cambria Math" panose="02040503050406030204" pitchFamily="18" charset="0"/>
+                                  </a:rPr>
                                   <m:t>⋯</m:t>
                                 </m:r>
                               </m:e>
@@ -4039,13 +4139,17 @@
                             <m:mr>
                               <m:e>
                                 <m:r>
-                                  <a:rPr lang="en-CA" b="0" i="1" smtClean="0"/>
+                                  <a:rPr lang="en-CA" b="0" i="1" smtClean="0">
+                                    <a:latin typeface="Cambria Math" panose="02040503050406030204" pitchFamily="18" charset="0"/>
+                                  </a:rPr>
                                   <m:t>0</m:t>
                                 </m:r>
                               </m:e>
                               <m:e>
                                 <m:r>
-                                  <a:rPr lang="en-CA" i="1" smtClean="0"/>
+                                  <a:rPr lang="en-CA" i="1" smtClean="0">
+                                    <a:latin typeface="Cambria Math" panose="02040503050406030204" pitchFamily="18" charset="0"/>
+                                  </a:rPr>
                                   <m:t>⋯</m:t>
                                 </m:r>
                               </m:e>
@@ -4062,13 +4166,17 @@
                             <m:mr>
                               <m:e>
                                 <m:r>
-                                  <a:rPr lang="en-CA" b="0" i="1" smtClean="0"/>
+                                  <a:rPr lang="en-CA" b="0" i="1" smtClean="0">
+                                    <a:latin typeface="Cambria Math" panose="02040503050406030204" pitchFamily="18" charset="0"/>
+                                  </a:rPr>
                                   <m:t>0</m:t>
                                 </m:r>
                               </m:e>
                               <m:e>
                                 <m:r>
-                                  <a:rPr lang="en-CA" i="1" smtClean="0"/>
+                                  <a:rPr lang="en-CA" i="1" smtClean="0">
+                                    <a:latin typeface="Cambria Math" panose="02040503050406030204" pitchFamily="18" charset="0"/>
+                                  </a:rPr>
                                   <m:t>⋯</m:t>
                                 </m:r>
                               </m:e>
@@ -4085,13 +4193,17 @@
                             <m:mr>
                               <m:e>
                                 <m:r>
-                                  <a:rPr lang="en-CA" b="0" i="1" smtClean="0"/>
+                                  <a:rPr lang="en-CA" b="0" i="1" smtClean="0">
+                                    <a:latin typeface="Cambria Math" panose="02040503050406030204" pitchFamily="18" charset="0"/>
+                                  </a:rPr>
                                   <m:t>0</m:t>
                                 </m:r>
                               </m:e>
                               <m:e>
                                 <m:r>
-                                  <a:rPr lang="en-CA" i="1" smtClean="0"/>
+                                  <a:rPr lang="en-CA" i="1" smtClean="0">
+                                    <a:latin typeface="Cambria Math" panose="02040503050406030204" pitchFamily="18" charset="0"/>
+                                  </a:rPr>
                                   <m:t>⋯</m:t>
                                 </m:r>
                               </m:e>
@@ -4108,13 +4220,17 @@
                             <m:mr>
                               <m:e>
                                 <m:r>
-                                  <a:rPr lang="en-CA" b="0" i="1" smtClean="0"/>
+                                  <a:rPr lang="en-CA" b="0" i="1" smtClean="0">
+                                    <a:latin typeface="Cambria Math" panose="02040503050406030204" pitchFamily="18" charset="0"/>
+                                  </a:rPr>
                                   <m:t>0</m:t>
                                 </m:r>
                               </m:e>
                               <m:e>
                                 <m:r>
-                                  <a:rPr lang="en-CA" i="1" smtClean="0"/>
+                                  <a:rPr lang="en-CA" i="1" smtClean="0">
+                                    <a:latin typeface="Cambria Math" panose="02040503050406030204" pitchFamily="18" charset="0"/>
+                                  </a:rPr>
                                   <m:t>⋯</m:t>
                                 </m:r>
                               </m:e>
@@ -4131,13 +4247,17 @@
                             <m:mr>
                               <m:e>
                                 <m:r>
-                                  <a:rPr lang="en-CA" b="0" i="1" smtClean="0"/>
+                                  <a:rPr lang="en-CA" b="0" i="1" smtClean="0">
+                                    <a:latin typeface="Cambria Math" panose="02040503050406030204" pitchFamily="18" charset="0"/>
+                                  </a:rPr>
                                   <m:t>0</m:t>
                                 </m:r>
                               </m:e>
                               <m:e>
                                 <m:r>
-                                  <a:rPr lang="en-CA" i="1" smtClean="0"/>
+                                  <a:rPr lang="en-CA" i="1" smtClean="0">
+                                    <a:latin typeface="Cambria Math" panose="02040503050406030204" pitchFamily="18" charset="0"/>
+                                  </a:rPr>
                                   <m:t>⋯</m:t>
                                 </m:r>
                               </m:e>
@@ -4154,19 +4274,25 @@
                             <m:mr>
                               <m:e>
                                 <m:r>
-                                  <a:rPr lang="en-CA" b="0" i="1" smtClean="0"/>
+                                  <a:rPr lang="en-CA" b="0" i="1" smtClean="0">
+                                    <a:latin typeface="Cambria Math" panose="02040503050406030204" pitchFamily="18" charset="0"/>
+                                  </a:rPr>
                                   <m:t>0</m:t>
                                 </m:r>
                               </m:e>
                               <m:e>
                                 <m:r>
-                                  <a:rPr lang="en-CA" i="1" smtClean="0"/>
+                                  <a:rPr lang="en-CA" i="1" smtClean="0">
+                                    <a:latin typeface="Cambria Math" panose="02040503050406030204" pitchFamily="18" charset="0"/>
+                                  </a:rPr>
                                   <m:t>⋯</m:t>
                                 </m:r>
                               </m:e>
                               <m:e>
                                 <m:r>
-                                  <a:rPr lang="en-CA" b="0" i="1" smtClean="0"/>
+                                  <a:rPr lang="en-CA" b="0" i="1" smtClean="0">
+                                    <a:latin typeface="Cambria Math" panose="02040503050406030204" pitchFamily="18" charset="0"/>
+                                  </a:rPr>
                                   <m:t>1</m:t>
                                 </m:r>
                               </m:e>
@@ -4182,7 +4308,7 @@
             </p:txBody>
           </p:sp>
         </mc:Choice>
-        <mc:Fallback>
+        <mc:Fallback xmlns="">
           <p:sp>
             <p:nvSpPr>
               <p:cNvPr id="7" name="TextBox 6">
@@ -4227,8 +4353,8 @@
           </p:sp>
         </mc:Fallback>
       </mc:AlternateContent>
-      <mc:AlternateContent xmlns:mc="http://schemas.openxmlformats.org/markup-compatibility/2006">
-        <mc:Choice xmlns:a14="http://schemas.microsoft.com/office/drawing/2010/main" Requires="a14">
+      <mc:AlternateContent xmlns:mc="http://schemas.openxmlformats.org/markup-compatibility/2006" xmlns:a14="http://schemas.microsoft.com/office/drawing/2010/main">
+        <mc:Choice Requires="a14">
           <p:sp>
             <p:nvSpPr>
               <p:cNvPr id="8" name="TextBox 7">
@@ -4257,6 +4383,7 @@
               </a:bodyPr>
               <a:lstStyle/>
               <a:p>
+                <a:pPr/>
                 <a14:m>
                   <m:oMathPara xmlns:m="http://schemas.openxmlformats.org/officeDocument/2006/math">
                     <m:oMathParaPr>
@@ -4268,7 +4395,9 @@
                           <m:begChr m:val="["/>
                           <m:endChr m:val="]"/>
                           <m:ctrlPr>
-                            <a:rPr lang="en-CA" i="1" smtClean="0"/>
+                            <a:rPr lang="en-CA" i="1" smtClean="0">
+                              <a:latin typeface="Cambria Math" panose="02040503050406030204" pitchFamily="18" charset="0"/>
+                            </a:rPr>
                           </m:ctrlPr>
                         </m:dPr>
                         <m:e>
@@ -4283,7 +4412,9 @@
                                 </m:mc>
                               </m:mcs>
                               <m:ctrlPr>
-                                <a:rPr lang="en-CA" i="1" smtClean="0"/>
+                                <a:rPr lang="en-CA" i="1" smtClean="0">
+                                  <a:latin typeface="Cambria Math" panose="02040503050406030204" pitchFamily="18" charset="0"/>
+                                </a:rPr>
                               </m:ctrlPr>
                             </m:mPr>
                             <m:mr>
@@ -4298,7 +4429,9 @@
                               </m:e>
                               <m:e>
                                 <m:r>
-                                  <a:rPr lang="en-CA" i="1" smtClean="0"/>
+                                  <a:rPr lang="en-CA" i="1" smtClean="0">
+                                    <a:latin typeface="Cambria Math" panose="02040503050406030204" pitchFamily="18" charset="0"/>
+                                  </a:rPr>
                                   <m:t>⋯</m:t>
                                 </m:r>
                               </m:e>
@@ -4323,7 +4456,9 @@
                               </m:e>
                               <m:e>
                                 <m:r>
-                                  <a:rPr lang="en-CA" i="1" smtClean="0"/>
+                                  <a:rPr lang="en-CA" i="1" smtClean="0">
+                                    <a:latin typeface="Cambria Math" panose="02040503050406030204" pitchFamily="18" charset="0"/>
+                                  </a:rPr>
                                   <m:t>⋯</m:t>
                                 </m:r>
                               </m:e>
@@ -4340,13 +4475,17 @@
                             <m:mr>
                               <m:e>
                                 <m:r>
-                                  <a:rPr lang="en-CA" b="0" i="1" smtClean="0"/>
+                                  <a:rPr lang="en-CA" b="0" i="1" smtClean="0">
+                                    <a:latin typeface="Cambria Math" panose="02040503050406030204" pitchFamily="18" charset="0"/>
+                                  </a:rPr>
                                   <m:t>0</m:t>
                                 </m:r>
                               </m:e>
                               <m:e>
                                 <m:r>
-                                  <a:rPr lang="en-CA" i="1" smtClean="0"/>
+                                  <a:rPr lang="en-CA" i="1" smtClean="0">
+                                    <a:latin typeface="Cambria Math" panose="02040503050406030204" pitchFamily="18" charset="0"/>
+                                  </a:rPr>
                                   <m:t>⋯</m:t>
                                 </m:r>
                               </m:e>
@@ -4363,13 +4502,17 @@
                             <m:mr>
                               <m:e>
                                 <m:r>
-                                  <a:rPr lang="en-CA" b="0" i="1" smtClean="0"/>
+                                  <a:rPr lang="en-CA" b="0" i="1" smtClean="0">
+                                    <a:latin typeface="Cambria Math" panose="02040503050406030204" pitchFamily="18" charset="0"/>
+                                  </a:rPr>
                                   <m:t>0</m:t>
                                 </m:r>
                               </m:e>
                               <m:e>
                                 <m:r>
-                                  <a:rPr lang="en-CA" i="1" smtClean="0"/>
+                                  <a:rPr lang="en-CA" i="1" smtClean="0">
+                                    <a:latin typeface="Cambria Math" panose="02040503050406030204" pitchFamily="18" charset="0"/>
+                                  </a:rPr>
                                   <m:t>⋯</m:t>
                                 </m:r>
                               </m:e>
@@ -4386,13 +4529,17 @@
                             <m:mr>
                               <m:e>
                                 <m:r>
-                                  <a:rPr lang="en-CA" b="0" i="1" smtClean="0"/>
+                                  <a:rPr lang="en-CA" b="0" i="1" smtClean="0">
+                                    <a:latin typeface="Cambria Math" panose="02040503050406030204" pitchFamily="18" charset="0"/>
+                                  </a:rPr>
                                   <m:t>0</m:t>
                                 </m:r>
                               </m:e>
                               <m:e>
                                 <m:r>
-                                  <a:rPr lang="en-CA" i="1" smtClean="0"/>
+                                  <a:rPr lang="en-CA" i="1" smtClean="0">
+                                    <a:latin typeface="Cambria Math" panose="02040503050406030204" pitchFamily="18" charset="0"/>
+                                  </a:rPr>
                                   <m:t>⋯</m:t>
                                 </m:r>
                               </m:e>
@@ -4416,13 +4563,17 @@
                             <m:mr>
                               <m:e>
                                 <m:r>
-                                  <a:rPr lang="en-CA" b="0" i="1" smtClean="0"/>
+                                  <a:rPr lang="en-CA" b="0" i="1" smtClean="0">
+                                    <a:latin typeface="Cambria Math" panose="02040503050406030204" pitchFamily="18" charset="0"/>
+                                  </a:rPr>
                                   <m:t>0</m:t>
                                 </m:r>
                               </m:e>
                               <m:e>
                                 <m:r>
-                                  <a:rPr lang="en-CA" i="1" smtClean="0"/>
+                                  <a:rPr lang="en-CA" i="1" smtClean="0">
+                                    <a:latin typeface="Cambria Math" panose="02040503050406030204" pitchFamily="18" charset="0"/>
+                                  </a:rPr>
                                   <m:t>⋯</m:t>
                                 </m:r>
                               </m:e>
@@ -4446,13 +4597,17 @@
                             <m:mr>
                               <m:e>
                                 <m:r>
-                                  <a:rPr lang="en-CA" b="0" i="1" smtClean="0"/>
+                                  <a:rPr lang="en-CA" b="0" i="1" smtClean="0">
+                                    <a:latin typeface="Cambria Math" panose="02040503050406030204" pitchFamily="18" charset="0"/>
+                                  </a:rPr>
                                   <m:t>0</m:t>
                                 </m:r>
                               </m:e>
                               <m:e>
                                 <m:r>
-                                  <a:rPr lang="en-CA" i="1" smtClean="0"/>
+                                  <a:rPr lang="en-CA" i="1" smtClean="0">
+                                    <a:latin typeface="Cambria Math" panose="02040503050406030204" pitchFamily="18" charset="0"/>
+                                  </a:rPr>
                                   <m:t>⋯</m:t>
                                 </m:r>
                               </m:e>
@@ -4476,13 +4631,17 @@
                             <m:mr>
                               <m:e>
                                 <m:r>
-                                  <a:rPr lang="en-CA" b="0" i="1" smtClean="0"/>
+                                  <a:rPr lang="en-CA" b="0" i="1" smtClean="0">
+                                    <a:latin typeface="Cambria Math" panose="02040503050406030204" pitchFamily="18" charset="0"/>
+                                  </a:rPr>
                                   <m:t>0</m:t>
                                 </m:r>
                               </m:e>
                               <m:e>
                                 <m:r>
-                                  <a:rPr lang="en-CA" i="1" smtClean="0"/>
+                                  <a:rPr lang="en-CA" i="1" smtClean="0">
+                                    <a:latin typeface="Cambria Math" panose="02040503050406030204" pitchFamily="18" charset="0"/>
+                                  </a:rPr>
                                   <m:t>⋯</m:t>
                                 </m:r>
                               </m:e>
@@ -4506,13 +4665,17 @@
                             <m:mr>
                               <m:e>
                                 <m:r>
-                                  <a:rPr lang="en-CA" b="0" i="1" smtClean="0"/>
+                                  <a:rPr lang="en-CA" b="0" i="1" smtClean="0">
+                                    <a:latin typeface="Cambria Math" panose="02040503050406030204" pitchFamily="18" charset="0"/>
+                                  </a:rPr>
                                   <m:t>0</m:t>
                                 </m:r>
                               </m:e>
                               <m:e>
                                 <m:r>
-                                  <a:rPr lang="en-CA" i="1" smtClean="0"/>
+                                  <a:rPr lang="en-CA" i="1" smtClean="0">
+                                    <a:latin typeface="Cambria Math" panose="02040503050406030204" pitchFamily="18" charset="0"/>
+                                  </a:rPr>
                                   <m:t>⋯</m:t>
                                 </m:r>
                               </m:e>
@@ -4536,13 +4699,17 @@
                             <m:mr>
                               <m:e>
                                 <m:r>
-                                  <a:rPr lang="en-CA" b="0" i="1" smtClean="0"/>
+                                  <a:rPr lang="en-CA" b="0" i="1" smtClean="0">
+                                    <a:latin typeface="Cambria Math" panose="02040503050406030204" pitchFamily="18" charset="0"/>
+                                  </a:rPr>
                                   <m:t>0</m:t>
                                 </m:r>
                               </m:e>
                               <m:e>
                                 <m:r>
-                                  <a:rPr lang="en-CA" i="1" smtClean="0"/>
+                                  <a:rPr lang="en-CA" i="1" smtClean="0">
+                                    <a:latin typeface="Cambria Math" panose="02040503050406030204" pitchFamily="18" charset="0"/>
+                                  </a:rPr>
                                   <m:t>⋯</m:t>
                                 </m:r>
                               </m:e>
@@ -4565,13 +4732,17 @@
                             <m:mr>
                               <m:e>
                                 <m:r>
-                                  <a:rPr lang="en-CA" b="0" i="1" smtClean="0"/>
+                                  <a:rPr lang="en-CA" b="0" i="1" smtClean="0">
+                                    <a:latin typeface="Cambria Math" panose="02040503050406030204" pitchFamily="18" charset="0"/>
+                                  </a:rPr>
                                   <m:t>0</m:t>
                                 </m:r>
                               </m:e>
                               <m:e>
                                 <m:r>
-                                  <a:rPr lang="en-CA" i="1" smtClean="0"/>
+                                  <a:rPr lang="en-CA" i="1" smtClean="0">
+                                    <a:latin typeface="Cambria Math" panose="02040503050406030204" pitchFamily="18" charset="0"/>
+                                  </a:rPr>
                                   <m:t>⋯</m:t>
                                 </m:r>
                               </m:e>
@@ -4594,13 +4765,17 @@
                             <m:mr>
                               <m:e>
                                 <m:r>
-                                  <a:rPr lang="en-CA" b="0" i="1" smtClean="0"/>
+                                  <a:rPr lang="en-CA" b="0" i="1" smtClean="0">
+                                    <a:latin typeface="Cambria Math" panose="02040503050406030204" pitchFamily="18" charset="0"/>
+                                  </a:rPr>
                                   <m:t>0</m:t>
                                 </m:r>
                               </m:e>
                               <m:e>
                                 <m:r>
-                                  <a:rPr lang="en-CA" i="1" smtClean="0"/>
+                                  <a:rPr lang="en-CA" i="1" smtClean="0">
+                                    <a:latin typeface="Cambria Math" panose="02040503050406030204" pitchFamily="18" charset="0"/>
+                                  </a:rPr>
                                   <m:t>⋯</m:t>
                                 </m:r>
                               </m:e>
@@ -4623,13 +4798,17 @@
                             <m:mr>
                               <m:e>
                                 <m:r>
-                                  <a:rPr lang="en-CA" b="0" i="1" smtClean="0"/>
+                                  <a:rPr lang="en-CA" b="0" i="1" smtClean="0">
+                                    <a:latin typeface="Cambria Math" panose="02040503050406030204" pitchFamily="18" charset="0"/>
+                                  </a:rPr>
                                   <m:t>0</m:t>
                                 </m:r>
                               </m:e>
                               <m:e>
                                 <m:r>
-                                  <a:rPr lang="en-CA" i="1" smtClean="0"/>
+                                  <a:rPr lang="en-CA" i="1" smtClean="0">
+                                    <a:latin typeface="Cambria Math" panose="02040503050406030204" pitchFamily="18" charset="0"/>
+                                  </a:rPr>
                                   <m:t>⋯</m:t>
                                 </m:r>
                               </m:e>
@@ -4646,19 +4825,25 @@
                             <m:mr>
                               <m:e>
                                 <m:r>
-                                  <a:rPr lang="en-CA" b="0" i="1" smtClean="0"/>
+                                  <a:rPr lang="en-CA" b="0" i="1" smtClean="0">
+                                    <a:latin typeface="Cambria Math" panose="02040503050406030204" pitchFamily="18" charset="0"/>
+                                  </a:rPr>
                                   <m:t>0</m:t>
                                 </m:r>
                               </m:e>
                               <m:e>
                                 <m:r>
-                                  <a:rPr lang="en-CA" i="1" smtClean="0"/>
+                                  <a:rPr lang="en-CA" i="1" smtClean="0">
+                                    <a:latin typeface="Cambria Math" panose="02040503050406030204" pitchFamily="18" charset="0"/>
+                                  </a:rPr>
                                   <m:t>⋯</m:t>
                                 </m:r>
                               </m:e>
                               <m:e>
                                 <m:r>
-                                  <a:rPr lang="en-CA" b="0" i="1" smtClean="0"/>
+                                  <a:rPr lang="en-CA" b="0" i="1" smtClean="0">
+                                    <a:latin typeface="Cambria Math" panose="02040503050406030204" pitchFamily="18" charset="0"/>
+                                  </a:rPr>
                                   <m:t>1</m:t>
                                 </m:r>
                               </m:e>
@@ -4674,7 +4859,7 @@
             </p:txBody>
           </p:sp>
         </mc:Choice>
-        <mc:Fallback>
+        <mc:Fallback xmlns="">
           <p:sp>
             <p:nvSpPr>
               <p:cNvPr id="8" name="TextBox 7">
@@ -5416,6 +5601,1080 @@
     <p:extLst>
       <p:ext uri="{BB962C8B-B14F-4D97-AF65-F5344CB8AC3E}">
         <p14:creationId xmlns:p14="http://schemas.microsoft.com/office/powerpoint/2010/main" val="3555366188"/>
+      </p:ext>
+    </p:extLst>
+  </p:cSld>
+  <p:clrMapOvr>
+    <a:masterClrMapping/>
+  </p:clrMapOvr>
+</p:sld>
+</file>
+
+<file path=ppt/slides/slide2.xml><?xml version="1.0" encoding="utf-8"?>
+<p:sld xmlns:a="http://schemas.openxmlformats.org/drawingml/2006/main" xmlns:r="http://schemas.openxmlformats.org/officeDocument/2006/relationships" xmlns:p="http://schemas.openxmlformats.org/presentationml/2006/main">
+  <p:cSld>
+    <p:spTree>
+      <p:nvGrpSpPr>
+        <p:cNvPr id="1" name=""/>
+        <p:cNvGrpSpPr/>
+        <p:nvPr/>
+      </p:nvGrpSpPr>
+      <p:grpSpPr>
+        <a:xfrm>
+          <a:off x="0" y="0"/>
+          <a:ext cx="0" cy="0"/>
+          <a:chOff x="0" y="0"/>
+          <a:chExt cx="0" cy="0"/>
+        </a:xfrm>
+      </p:grpSpPr>
+      <p:sp>
+        <p:nvSpPr>
+          <p:cNvPr id="5" name="Rectangle 4">
+            <a:extLst>
+              <a:ext uri="{FF2B5EF4-FFF2-40B4-BE49-F238E27FC236}">
+                <a16:creationId xmlns:a16="http://schemas.microsoft.com/office/drawing/2014/main" id="{7EE2086F-124E-4FDA-AC40-29E5B133BA88}"/>
+              </a:ext>
+            </a:extLst>
+          </p:cNvPr>
+          <p:cNvSpPr/>
+          <p:nvPr/>
+        </p:nvSpPr>
+        <p:spPr>
+          <a:xfrm>
+            <a:off x="179109" y="683199"/>
+            <a:ext cx="12116586" cy="3970318"/>
+          </a:xfrm>
+          <a:prstGeom prst="rect">
+            <a:avLst/>
+          </a:prstGeom>
+        </p:spPr>
+        <p:txBody>
+          <a:bodyPr wrap="square">
+            <a:spAutoFit/>
+          </a:bodyPr>
+          <a:lstStyle/>
+          <a:p>
+            <a:r>
+              <a:rPr lang="en-CA" dirty="0"/>
+              <a:t>       [0.99886, 0.00101,      0.     ,  0.     , 0.     , 0.     , 0.     ,  0.     , 0.     , 0.     , 0.     , 0.     , 0.00012, 0.     ],</a:t>
+            </a:r>
+          </a:p>
+          <a:p>
+            <a:r>
+              <a:rPr lang="en-CA" dirty="0"/>
+              <a:t>       [0.00032, 0.99855, 0.00096, 0.     , 0.     , 0.     , 0.     ,  0.     , 0.     , 0.     , 0.     , 0.     , 0.00017, 0.     ],</a:t>
+            </a:r>
+          </a:p>
+          <a:p>
+            <a:r>
+              <a:rPr lang="en-CA" dirty="0"/>
+              <a:t>       [0.     ,       0.00113, 0.99715, 0.00147, 0.     , 0.     , 0.     ,  0.     , 0.     , 0.     , 0.     , 0.     , 0.00024, 0.     ],</a:t>
+            </a:r>
+          </a:p>
+          <a:p>
+            <a:r>
+              <a:rPr lang="en-CA" dirty="0"/>
+              <a:t>       [0.     , 0.     , 0.00311, 0.99338, 0.00319, 0.     , 0.     ,   0.     , 0.     , 0.     , 0.     , 0.     , 0.00032, 0.     ],</a:t>
+            </a:r>
+          </a:p>
+          <a:p>
+            <a:r>
+              <a:rPr lang="en-CA" dirty="0"/>
+              <a:t>       [0.     , 0.     , 0.     , 0.0067 , 0.98694, 0.00552, 0.     ,    0.     , 0.     , 0.     , 0.     , 0.     , 0.00042, 0.00043],</a:t>
+            </a:r>
+          </a:p>
+          <a:p>
+            <a:r>
+              <a:rPr lang="en-CA" dirty="0"/>
+              <a:t>       [0.     , 0.     , 0.     , 0.     , 0.01069, 0.98   , 0.0081 ,        0.     , 0.     , 0.     , 0.     , 0.     , 0.00056, 0.00064],</a:t>
+            </a:r>
+          </a:p>
+          <a:p>
+            <a:r>
+              <a:rPr lang="en-CA" dirty="0"/>
+              <a:t>       [0.     , 0.     , 0.     , 0.     , 0.     , 0.01475, 0.97284,     0.0108 , 0.     , 0.     , 0.     , 0.     , 0.00076, 0.00085],</a:t>
+            </a:r>
+          </a:p>
+          <a:p>
+            <a:r>
+              <a:rPr lang="en-CA" dirty="0"/>
+              <a:t>       [0.     , 0.     , 0.     , 0.     , 0.     , 0.     , 0.02432,    0.94999, 0.02359, 0.     , 0.     , 0.     , 0.00103, 0.00107],</a:t>
+            </a:r>
+          </a:p>
+          <a:p>
+            <a:r>
+              <a:rPr lang="en-CA" dirty="0"/>
+              <a:t>       [0.     , 0.     , 0.     , 0.     , 0.     , 0.     , 0.     ,     0.03301, 0.93331, 0.03082, 0.     , 0.     , 0.00137, 0.00149],</a:t>
+            </a:r>
+          </a:p>
+          <a:p>
+            <a:r>
+              <a:rPr lang="en-CA" dirty="0"/>
+              <a:t>       [0.     , 0.     , 0.     , 0.     , 0.     , 0.     , 0.     ,      0.     , 0.0394 , 0.91954, 0.03717, 0.     , 0.00186, 0.00203],</a:t>
+            </a:r>
+          </a:p>
+          <a:p>
+            <a:r>
+              <a:rPr lang="en-CA" dirty="0"/>
+              <a:t>       [0.     , 0.     , 0.     , 0.     , 0.     , 0.     , 0.     ,      0.     , 0.     , 0.03033, 0.93319, 0.03147, 0.00245, 0.00256],</a:t>
+            </a:r>
+          </a:p>
+          <a:p>
+            <a:r>
+              <a:rPr lang="en-CA" dirty="0"/>
+              <a:t>       [0.     , 0.     , 0.     , 0.     , 0.     , 0.     , 0.     ,      0.     , 0.     , 0.     , 0.0318 , 0.96092, 0.00355, 0.00373],</a:t>
+            </a:r>
+          </a:p>
+          <a:p>
+            <a:r>
+              <a:rPr lang="en-CA" dirty="0"/>
+              <a:t>       [0.     , 0.     , 0.     , 0.     , 0.     , 0.     , 0.     ,      0.     , 0.     , 0.     , 0.     , 0.     , 1.     , 0.     ],</a:t>
+            </a:r>
+          </a:p>
+          <a:p>
+            <a:r>
+              <a:rPr lang="en-CA" dirty="0"/>
+              <a:t>       [0.     , 0.     , 0.     , 0.     , 0.     , 0.     , 0.     ,      0.     , 0.     , 0.     , 0.     , 0.     , 0.     , 1.     ]]</a:t>
+            </a:r>
+          </a:p>
+        </p:txBody>
+      </p:sp>
+      <p:sp>
+        <p:nvSpPr>
+          <p:cNvPr id="6" name="TextBox 5">
+            <a:extLst>
+              <a:ext uri="{FF2B5EF4-FFF2-40B4-BE49-F238E27FC236}">
+                <a16:creationId xmlns:a16="http://schemas.microsoft.com/office/drawing/2014/main" id="{6465C7BC-DD5A-4829-9F86-F069F24717E7}"/>
+              </a:ext>
+            </a:extLst>
+          </p:cNvPr>
+          <p:cNvSpPr txBox="1"/>
+          <p:nvPr/>
+        </p:nvSpPr>
+        <p:spPr>
+          <a:xfrm>
+            <a:off x="4326903" y="313867"/>
+            <a:ext cx="1457643" cy="369332"/>
+          </a:xfrm>
+          <a:prstGeom prst="rect">
+            <a:avLst/>
+          </a:prstGeom>
+          <a:noFill/>
+        </p:spPr>
+        <p:txBody>
+          <a:bodyPr wrap="none" rtlCol="0">
+            <a:spAutoFit/>
+          </a:bodyPr>
+          <a:lstStyle/>
+          <a:p>
+            <a:r>
+              <a:rPr lang="en-CA" dirty="0"/>
+              <a:t>Threshold = 5</a:t>
+            </a:r>
+          </a:p>
+        </p:txBody>
+      </p:sp>
+    </p:spTree>
+    <p:extLst>
+      <p:ext uri="{BB962C8B-B14F-4D97-AF65-F5344CB8AC3E}">
+        <p14:creationId xmlns:p14="http://schemas.microsoft.com/office/powerpoint/2010/main" val="2187361555"/>
+      </p:ext>
+    </p:extLst>
+  </p:cSld>
+  <p:clrMapOvr>
+    <a:masterClrMapping/>
+  </p:clrMapOvr>
+</p:sld>
+</file>
+
+<file path=ppt/slides/slide3.xml><?xml version="1.0" encoding="utf-8"?>
+<p:sld xmlns:a="http://schemas.openxmlformats.org/drawingml/2006/main" xmlns:r="http://schemas.openxmlformats.org/officeDocument/2006/relationships" xmlns:p="http://schemas.openxmlformats.org/presentationml/2006/main">
+  <p:cSld>
+    <p:spTree>
+      <p:nvGrpSpPr>
+        <p:cNvPr id="1" name=""/>
+        <p:cNvGrpSpPr/>
+        <p:nvPr/>
+      </p:nvGrpSpPr>
+      <p:grpSpPr>
+        <a:xfrm>
+          <a:off x="0" y="0"/>
+          <a:ext cx="0" cy="0"/>
+          <a:chOff x="0" y="0"/>
+          <a:chExt cx="0" cy="0"/>
+        </a:xfrm>
+      </p:grpSpPr>
+      <p:pic>
+        <p:nvPicPr>
+          <p:cNvPr id="4" name="Picture 3">
+            <a:extLst>
+              <a:ext uri="{FF2B5EF4-FFF2-40B4-BE49-F238E27FC236}">
+                <a16:creationId xmlns:a16="http://schemas.microsoft.com/office/drawing/2014/main" id="{0E8F8411-8BA3-45A3-9659-A8D62E8962A2}"/>
+              </a:ext>
+            </a:extLst>
+          </p:cNvPr>
+          <p:cNvPicPr>
+            <a:picLocks noChangeAspect="1"/>
+          </p:cNvPicPr>
+          <p:nvPr/>
+        </p:nvPicPr>
+        <p:blipFill>
+          <a:blip r:embed="rId2"/>
+          <a:stretch>
+            <a:fillRect/>
+          </a:stretch>
+        </p:blipFill>
+        <p:spPr>
+          <a:xfrm>
+            <a:off x="1945977" y="1893070"/>
+            <a:ext cx="1714500" cy="2619375"/>
+          </a:xfrm>
+          <a:prstGeom prst="rect">
+            <a:avLst/>
+          </a:prstGeom>
+        </p:spPr>
+      </p:pic>
+      <p:sp>
+        <p:nvSpPr>
+          <p:cNvPr id="5" name="TextBox 4">
+            <a:extLst>
+              <a:ext uri="{FF2B5EF4-FFF2-40B4-BE49-F238E27FC236}">
+                <a16:creationId xmlns:a16="http://schemas.microsoft.com/office/drawing/2014/main" id="{4B129187-22DF-4E98-BD1A-1C8D737942F5}"/>
+              </a:ext>
+            </a:extLst>
+          </p:cNvPr>
+          <p:cNvSpPr txBox="1"/>
+          <p:nvPr/>
+        </p:nvSpPr>
+        <p:spPr>
+          <a:xfrm>
+            <a:off x="2074405" y="1523738"/>
+            <a:ext cx="1457643" cy="369332"/>
+          </a:xfrm>
+          <a:prstGeom prst="rect">
+            <a:avLst/>
+          </a:prstGeom>
+          <a:noFill/>
+        </p:spPr>
+        <p:txBody>
+          <a:bodyPr wrap="none" rtlCol="0">
+            <a:spAutoFit/>
+          </a:bodyPr>
+          <a:lstStyle/>
+          <a:p>
+            <a:r>
+              <a:rPr lang="en-CA" dirty="0"/>
+              <a:t>Threshold = 5</a:t>
+            </a:r>
+          </a:p>
+        </p:txBody>
+      </p:sp>
+      <p:sp>
+        <p:nvSpPr>
+          <p:cNvPr id="6" name="TextBox 5">
+            <a:extLst>
+              <a:ext uri="{FF2B5EF4-FFF2-40B4-BE49-F238E27FC236}">
+                <a16:creationId xmlns:a16="http://schemas.microsoft.com/office/drawing/2014/main" id="{D32F5EEF-819E-4B57-AC62-39E0FD6D5AA8}"/>
+              </a:ext>
+            </a:extLst>
+          </p:cNvPr>
+          <p:cNvSpPr txBox="1"/>
+          <p:nvPr/>
+        </p:nvSpPr>
+        <p:spPr>
+          <a:xfrm>
+            <a:off x="3532048" y="1239247"/>
+            <a:ext cx="977640" cy="369332"/>
+          </a:xfrm>
+          <a:prstGeom prst="rect">
+            <a:avLst/>
+          </a:prstGeom>
+          <a:noFill/>
+        </p:spPr>
+        <p:txBody>
+          <a:bodyPr wrap="none" rtlCol="0">
+            <a:spAutoFit/>
+          </a:bodyPr>
+          <a:lstStyle/>
+          <a:p>
+            <a:r>
+              <a:rPr lang="en-CA" dirty="0"/>
+              <a:t>R Matrix</a:t>
+            </a:r>
+          </a:p>
+        </p:txBody>
+      </p:sp>
+      <p:pic>
+        <p:nvPicPr>
+          <p:cNvPr id="7" name="Picture 6">
+            <a:extLst>
+              <a:ext uri="{FF2B5EF4-FFF2-40B4-BE49-F238E27FC236}">
+                <a16:creationId xmlns:a16="http://schemas.microsoft.com/office/drawing/2014/main" id="{D0D00F6C-C467-4A18-8203-0ED0927DD6F6}"/>
+              </a:ext>
+            </a:extLst>
+          </p:cNvPr>
+          <p:cNvPicPr>
+            <a:picLocks noChangeAspect="1"/>
+          </p:cNvPicPr>
+          <p:nvPr/>
+        </p:nvPicPr>
+        <p:blipFill rotWithShape="1">
+          <a:blip r:embed="rId3"/>
+          <a:srcRect r="5038"/>
+          <a:stretch/>
+        </p:blipFill>
+        <p:spPr>
+          <a:xfrm>
+            <a:off x="6854914" y="1921645"/>
+            <a:ext cx="1121594" cy="2552700"/>
+          </a:xfrm>
+          <a:prstGeom prst="rect">
+            <a:avLst/>
+          </a:prstGeom>
+        </p:spPr>
+      </p:pic>
+      <p:sp>
+        <p:nvSpPr>
+          <p:cNvPr id="8" name="TextBox 7">
+            <a:extLst>
+              <a:ext uri="{FF2B5EF4-FFF2-40B4-BE49-F238E27FC236}">
+                <a16:creationId xmlns:a16="http://schemas.microsoft.com/office/drawing/2014/main" id="{DFE90FFF-080F-42D0-BA78-E46B820E32F2}"/>
+              </a:ext>
+            </a:extLst>
+          </p:cNvPr>
+          <p:cNvSpPr txBox="1"/>
+          <p:nvPr/>
+        </p:nvSpPr>
+        <p:spPr>
+          <a:xfrm>
+            <a:off x="6999469" y="916081"/>
+            <a:ext cx="2840820" cy="646331"/>
+          </a:xfrm>
+          <a:prstGeom prst="rect">
+            <a:avLst/>
+          </a:prstGeom>
+          <a:noFill/>
+        </p:spPr>
+        <p:txBody>
+          <a:bodyPr wrap="square" rtlCol="0">
+            <a:spAutoFit/>
+          </a:bodyPr>
+          <a:lstStyle/>
+          <a:p>
+            <a:r>
+              <a:rPr lang="en-CA" dirty="0"/>
+              <a:t>Expected time before death OR released from hospital</a:t>
+            </a:r>
+          </a:p>
+        </p:txBody>
+      </p:sp>
+      <p:sp>
+        <p:nvSpPr>
+          <p:cNvPr id="9" name="TextBox 8">
+            <a:extLst>
+              <a:ext uri="{FF2B5EF4-FFF2-40B4-BE49-F238E27FC236}">
+                <a16:creationId xmlns:a16="http://schemas.microsoft.com/office/drawing/2014/main" id="{77199D31-9CF6-44BE-B5C0-148799822C29}"/>
+              </a:ext>
+            </a:extLst>
+          </p:cNvPr>
+          <p:cNvSpPr txBox="1"/>
+          <p:nvPr/>
+        </p:nvSpPr>
+        <p:spPr>
+          <a:xfrm>
+            <a:off x="6705275" y="1576002"/>
+            <a:ext cx="1457643" cy="369332"/>
+          </a:xfrm>
+          <a:prstGeom prst="rect">
+            <a:avLst/>
+          </a:prstGeom>
+          <a:noFill/>
+        </p:spPr>
+        <p:txBody>
+          <a:bodyPr wrap="none" rtlCol="0">
+            <a:spAutoFit/>
+          </a:bodyPr>
+          <a:lstStyle/>
+          <a:p>
+            <a:r>
+              <a:rPr lang="en-CA" dirty="0"/>
+              <a:t>Threshold = 5</a:t>
+            </a:r>
+          </a:p>
+        </p:txBody>
+      </p:sp>
+      <p:pic>
+        <p:nvPicPr>
+          <p:cNvPr id="15" name="Picture 14">
+            <a:extLst>
+              <a:ext uri="{FF2B5EF4-FFF2-40B4-BE49-F238E27FC236}">
+                <a16:creationId xmlns:a16="http://schemas.microsoft.com/office/drawing/2014/main" id="{0C30BBBA-C95A-446F-BB23-A71609E4E082}"/>
+              </a:ext>
+            </a:extLst>
+          </p:cNvPr>
+          <p:cNvPicPr>
+            <a:picLocks noChangeAspect="1"/>
+          </p:cNvPicPr>
+          <p:nvPr/>
+        </p:nvPicPr>
+        <p:blipFill>
+          <a:blip r:embed="rId4"/>
+          <a:stretch>
+            <a:fillRect/>
+          </a:stretch>
+        </p:blipFill>
+        <p:spPr>
+          <a:xfrm>
+            <a:off x="3902709" y="1893070"/>
+            <a:ext cx="1733550" cy="2571750"/>
+          </a:xfrm>
+          <a:prstGeom prst="rect">
+            <a:avLst/>
+          </a:prstGeom>
+        </p:spPr>
+      </p:pic>
+      <p:sp>
+        <p:nvSpPr>
+          <p:cNvPr id="16" name="TextBox 15">
+            <a:extLst>
+              <a:ext uri="{FF2B5EF4-FFF2-40B4-BE49-F238E27FC236}">
+                <a16:creationId xmlns:a16="http://schemas.microsoft.com/office/drawing/2014/main" id="{CE9EC735-BC7C-484A-B42A-A28FF8C9371F}"/>
+              </a:ext>
+            </a:extLst>
+          </p:cNvPr>
+          <p:cNvSpPr txBox="1"/>
+          <p:nvPr/>
+        </p:nvSpPr>
+        <p:spPr>
+          <a:xfrm>
+            <a:off x="4094298" y="1533692"/>
+            <a:ext cx="1407950" cy="369332"/>
+          </a:xfrm>
+          <a:prstGeom prst="rect">
+            <a:avLst/>
+          </a:prstGeom>
+          <a:noFill/>
+        </p:spPr>
+        <p:txBody>
+          <a:bodyPr wrap="none" rtlCol="0">
+            <a:spAutoFit/>
+          </a:bodyPr>
+          <a:lstStyle/>
+          <a:p>
+            <a:r>
+              <a:rPr lang="en-CA" dirty="0"/>
+              <a:t>No threshold</a:t>
+            </a:r>
+          </a:p>
+        </p:txBody>
+      </p:sp>
+      <p:pic>
+        <p:nvPicPr>
+          <p:cNvPr id="17" name="Picture 16">
+            <a:extLst>
+              <a:ext uri="{FF2B5EF4-FFF2-40B4-BE49-F238E27FC236}">
+                <a16:creationId xmlns:a16="http://schemas.microsoft.com/office/drawing/2014/main" id="{484845AD-6E25-4321-A1F6-C45D1598A51C}"/>
+              </a:ext>
+            </a:extLst>
+          </p:cNvPr>
+          <p:cNvPicPr>
+            <a:picLocks noChangeAspect="1"/>
+          </p:cNvPicPr>
+          <p:nvPr/>
+        </p:nvPicPr>
+        <p:blipFill rotWithShape="1">
+          <a:blip r:embed="rId5"/>
+          <a:srcRect t="2350"/>
+          <a:stretch/>
+        </p:blipFill>
+        <p:spPr>
+          <a:xfrm>
+            <a:off x="8419879" y="1945334"/>
+            <a:ext cx="1162050" cy="2567111"/>
+          </a:xfrm>
+          <a:prstGeom prst="rect">
+            <a:avLst/>
+          </a:prstGeom>
+        </p:spPr>
+      </p:pic>
+      <p:sp>
+        <p:nvSpPr>
+          <p:cNvPr id="18" name="TextBox 17">
+            <a:extLst>
+              <a:ext uri="{FF2B5EF4-FFF2-40B4-BE49-F238E27FC236}">
+                <a16:creationId xmlns:a16="http://schemas.microsoft.com/office/drawing/2014/main" id="{8F1D77AA-8E9A-46E3-8523-7976DAA9E0EE}"/>
+              </a:ext>
+            </a:extLst>
+          </p:cNvPr>
+          <p:cNvSpPr txBox="1"/>
+          <p:nvPr/>
+        </p:nvSpPr>
+        <p:spPr>
+          <a:xfrm>
+            <a:off x="8296929" y="1538062"/>
+            <a:ext cx="1407950" cy="369332"/>
+          </a:xfrm>
+          <a:prstGeom prst="rect">
+            <a:avLst/>
+          </a:prstGeom>
+          <a:noFill/>
+        </p:spPr>
+        <p:txBody>
+          <a:bodyPr wrap="none" rtlCol="0">
+            <a:spAutoFit/>
+          </a:bodyPr>
+          <a:lstStyle/>
+          <a:p>
+            <a:r>
+              <a:rPr lang="en-CA" dirty="0"/>
+              <a:t>No threshold</a:t>
+            </a:r>
+          </a:p>
+        </p:txBody>
+      </p:sp>
+      <p:sp>
+        <p:nvSpPr>
+          <p:cNvPr id="19" name="TextBox 18">
+            <a:extLst>
+              <a:ext uri="{FF2B5EF4-FFF2-40B4-BE49-F238E27FC236}">
+                <a16:creationId xmlns:a16="http://schemas.microsoft.com/office/drawing/2014/main" id="{9870B26F-2323-429D-AF20-C5AD95091FD4}"/>
+              </a:ext>
+            </a:extLst>
+          </p:cNvPr>
+          <p:cNvSpPr txBox="1"/>
+          <p:nvPr/>
+        </p:nvSpPr>
+        <p:spPr>
+          <a:xfrm>
+            <a:off x="7674098" y="599845"/>
+            <a:ext cx="870623" cy="369332"/>
+          </a:xfrm>
+          <a:prstGeom prst="rect">
+            <a:avLst/>
+          </a:prstGeom>
+          <a:noFill/>
+        </p:spPr>
+        <p:txBody>
+          <a:bodyPr wrap="none" rtlCol="0">
+            <a:spAutoFit/>
+          </a:bodyPr>
+          <a:lstStyle/>
+          <a:p>
+            <a:r>
+              <a:rPr lang="en-CA" dirty="0"/>
+              <a:t>Part (a)</a:t>
+            </a:r>
+          </a:p>
+        </p:txBody>
+      </p:sp>
+      <p:sp>
+        <p:nvSpPr>
+          <p:cNvPr id="20" name="TextBox 19">
+            <a:extLst>
+              <a:ext uri="{FF2B5EF4-FFF2-40B4-BE49-F238E27FC236}">
+                <a16:creationId xmlns:a16="http://schemas.microsoft.com/office/drawing/2014/main" id="{FB2D95D0-4B26-49CC-A3F9-CDAB78AFF385}"/>
+              </a:ext>
+            </a:extLst>
+          </p:cNvPr>
+          <p:cNvSpPr txBox="1"/>
+          <p:nvPr/>
+        </p:nvSpPr>
+        <p:spPr>
+          <a:xfrm>
+            <a:off x="6999469" y="4543335"/>
+            <a:ext cx="2136995" cy="369332"/>
+          </a:xfrm>
+          <a:prstGeom prst="rect">
+            <a:avLst/>
+          </a:prstGeom>
+          <a:noFill/>
+        </p:spPr>
+        <p:txBody>
+          <a:bodyPr wrap="none" rtlCol="0">
+            <a:spAutoFit/>
+          </a:bodyPr>
+          <a:lstStyle/>
+          <a:p>
+            <a:r>
+              <a:rPr lang="en-CA" dirty="0"/>
+              <a:t>From: [I-Q]</a:t>
+            </a:r>
+            <a:r>
+              <a:rPr lang="en-CA" baseline="30000" dirty="0"/>
+              <a:t>-1</a:t>
+            </a:r>
+            <a:r>
+              <a:rPr lang="en-CA" dirty="0"/>
+              <a:t> x [ones]</a:t>
+            </a:r>
+          </a:p>
+        </p:txBody>
+      </p:sp>
+    </p:spTree>
+    <p:extLst>
+      <p:ext uri="{BB962C8B-B14F-4D97-AF65-F5344CB8AC3E}">
+        <p14:creationId xmlns:p14="http://schemas.microsoft.com/office/powerpoint/2010/main" val="67202188"/>
+      </p:ext>
+    </p:extLst>
+  </p:cSld>
+  <p:clrMapOvr>
+    <a:masterClrMapping/>
+  </p:clrMapOvr>
+</p:sld>
+</file>
+
+<file path=ppt/slides/slide4.xml><?xml version="1.0" encoding="utf-8"?>
+<p:sld xmlns:a="http://schemas.openxmlformats.org/drawingml/2006/main" xmlns:r="http://schemas.openxmlformats.org/officeDocument/2006/relationships" xmlns:p="http://schemas.openxmlformats.org/presentationml/2006/main">
+  <p:cSld>
+    <p:spTree>
+      <p:nvGrpSpPr>
+        <p:cNvPr id="1" name=""/>
+        <p:cNvGrpSpPr/>
+        <p:nvPr/>
+      </p:nvGrpSpPr>
+      <p:grpSpPr>
+        <a:xfrm>
+          <a:off x="0" y="0"/>
+          <a:ext cx="0" cy="0"/>
+          <a:chOff x="0" y="0"/>
+          <a:chExt cx="0" cy="0"/>
+        </a:xfrm>
+      </p:grpSpPr>
+      <p:pic>
+        <p:nvPicPr>
+          <p:cNvPr id="4" name="Picture 3">
+            <a:extLst>
+              <a:ext uri="{FF2B5EF4-FFF2-40B4-BE49-F238E27FC236}">
+                <a16:creationId xmlns:a16="http://schemas.microsoft.com/office/drawing/2014/main" id="{D871FDBA-874A-47B6-AD3E-856DC717D621}"/>
+              </a:ext>
+            </a:extLst>
+          </p:cNvPr>
+          <p:cNvPicPr>
+            <a:picLocks noChangeAspect="1"/>
+          </p:cNvPicPr>
+          <p:nvPr/>
+        </p:nvPicPr>
+        <p:blipFill>
+          <a:blip r:embed="rId2"/>
+          <a:stretch>
+            <a:fillRect/>
+          </a:stretch>
+        </p:blipFill>
+        <p:spPr>
+          <a:xfrm>
+            <a:off x="3572174" y="2216674"/>
+            <a:ext cx="1714500" cy="2562225"/>
+          </a:xfrm>
+          <a:prstGeom prst="rect">
+            <a:avLst/>
+          </a:prstGeom>
+        </p:spPr>
+      </p:pic>
+      <p:sp>
+        <p:nvSpPr>
+          <p:cNvPr id="5" name="TextBox 4">
+            <a:extLst>
+              <a:ext uri="{FF2B5EF4-FFF2-40B4-BE49-F238E27FC236}">
+                <a16:creationId xmlns:a16="http://schemas.microsoft.com/office/drawing/2014/main" id="{EA69A2C0-F807-4EBC-8FA2-BB8E04573AEA}"/>
+              </a:ext>
+            </a:extLst>
+          </p:cNvPr>
+          <p:cNvSpPr txBox="1"/>
+          <p:nvPr/>
+        </p:nvSpPr>
+        <p:spPr>
+          <a:xfrm>
+            <a:off x="3700601" y="1585216"/>
+            <a:ext cx="1457643" cy="369332"/>
+          </a:xfrm>
+          <a:prstGeom prst="rect">
+            <a:avLst/>
+          </a:prstGeom>
+          <a:noFill/>
+        </p:spPr>
+        <p:txBody>
+          <a:bodyPr wrap="none" rtlCol="0">
+            <a:spAutoFit/>
+          </a:bodyPr>
+          <a:lstStyle/>
+          <a:p>
+            <a:r>
+              <a:rPr lang="en-CA" dirty="0"/>
+              <a:t>Threshold = 5</a:t>
+            </a:r>
+          </a:p>
+        </p:txBody>
+      </p:sp>
+      <p:sp>
+        <p:nvSpPr>
+          <p:cNvPr id="6" name="TextBox 5">
+            <a:extLst>
+              <a:ext uri="{FF2B5EF4-FFF2-40B4-BE49-F238E27FC236}">
+                <a16:creationId xmlns:a16="http://schemas.microsoft.com/office/drawing/2014/main" id="{A957E038-CACA-45B8-A40C-E816CF380BAC}"/>
+              </a:ext>
+            </a:extLst>
+          </p:cNvPr>
+          <p:cNvSpPr txBox="1"/>
+          <p:nvPr/>
+        </p:nvSpPr>
+        <p:spPr>
+          <a:xfrm>
+            <a:off x="3624013" y="1879134"/>
+            <a:ext cx="729174" cy="369332"/>
+          </a:xfrm>
+          <a:prstGeom prst="rect">
+            <a:avLst/>
+          </a:prstGeom>
+          <a:noFill/>
+        </p:spPr>
+        <p:txBody>
+          <a:bodyPr wrap="none" rtlCol="0">
+            <a:spAutoFit/>
+          </a:bodyPr>
+          <a:lstStyle/>
+          <a:p>
+            <a:r>
+              <a:rPr lang="en-CA" dirty="0"/>
+              <a:t>death</a:t>
+            </a:r>
+          </a:p>
+        </p:txBody>
+      </p:sp>
+      <p:sp>
+        <p:nvSpPr>
+          <p:cNvPr id="7" name="TextBox 6">
+            <a:extLst>
+              <a:ext uri="{FF2B5EF4-FFF2-40B4-BE49-F238E27FC236}">
+                <a16:creationId xmlns:a16="http://schemas.microsoft.com/office/drawing/2014/main" id="{0F56545A-B153-4215-864F-1145A5E58B2C}"/>
+              </a:ext>
+            </a:extLst>
+          </p:cNvPr>
+          <p:cNvSpPr txBox="1"/>
+          <p:nvPr/>
+        </p:nvSpPr>
+        <p:spPr>
+          <a:xfrm>
+            <a:off x="4329273" y="1879134"/>
+            <a:ext cx="1141210" cy="369332"/>
+          </a:xfrm>
+          <a:prstGeom prst="rect">
+            <a:avLst/>
+          </a:prstGeom>
+          <a:noFill/>
+        </p:spPr>
+        <p:txBody>
+          <a:bodyPr wrap="none" rtlCol="0">
+            <a:spAutoFit/>
+          </a:bodyPr>
+          <a:lstStyle/>
+          <a:p>
+            <a:r>
+              <a:rPr lang="en-CA" dirty="0"/>
+              <a:t>transplant</a:t>
+            </a:r>
+          </a:p>
+        </p:txBody>
+      </p:sp>
+      <p:sp>
+        <p:nvSpPr>
+          <p:cNvPr id="8" name="TextBox 7">
+            <a:extLst>
+              <a:ext uri="{FF2B5EF4-FFF2-40B4-BE49-F238E27FC236}">
+                <a16:creationId xmlns:a16="http://schemas.microsoft.com/office/drawing/2014/main" id="{2D9D110A-6EB6-403B-83D1-BF3505487C83}"/>
+              </a:ext>
+            </a:extLst>
+          </p:cNvPr>
+          <p:cNvSpPr txBox="1"/>
+          <p:nvPr/>
+        </p:nvSpPr>
+        <p:spPr>
+          <a:xfrm>
+            <a:off x="1816085" y="3128454"/>
+            <a:ext cx="1632948" cy="369332"/>
+          </a:xfrm>
+          <a:prstGeom prst="rect">
+            <a:avLst/>
+          </a:prstGeom>
+          <a:noFill/>
+        </p:spPr>
+        <p:txBody>
+          <a:bodyPr wrap="none" rtlCol="0">
+            <a:spAutoFit/>
+          </a:bodyPr>
+          <a:lstStyle/>
+          <a:p>
+            <a:r>
+              <a:rPr lang="en-CA" dirty="0"/>
+              <a:t>Entrance state </a:t>
+            </a:r>
+            <a:r>
+              <a:rPr lang="en-CA" dirty="0" err="1"/>
+              <a:t>i</a:t>
+            </a:r>
+            <a:endParaRPr lang="en-CA" dirty="0"/>
+          </a:p>
+        </p:txBody>
+      </p:sp>
+      <p:sp>
+        <p:nvSpPr>
+          <p:cNvPr id="9" name="TextBox 8">
+            <a:extLst>
+              <a:ext uri="{FF2B5EF4-FFF2-40B4-BE49-F238E27FC236}">
+                <a16:creationId xmlns:a16="http://schemas.microsoft.com/office/drawing/2014/main" id="{60053F6B-3799-4F3F-B098-281DDA7E7376}"/>
+              </a:ext>
+            </a:extLst>
+          </p:cNvPr>
+          <p:cNvSpPr txBox="1"/>
+          <p:nvPr/>
+        </p:nvSpPr>
+        <p:spPr>
+          <a:xfrm>
+            <a:off x="3624013" y="1269280"/>
+            <a:ext cx="4016099" cy="369332"/>
+          </a:xfrm>
+          <a:prstGeom prst="rect">
+            <a:avLst/>
+          </a:prstGeom>
+          <a:noFill/>
+        </p:spPr>
+        <p:txBody>
+          <a:bodyPr wrap="none" rtlCol="0">
+            <a:spAutoFit/>
+          </a:bodyPr>
+          <a:lstStyle/>
+          <a:p>
+            <a:r>
+              <a:rPr lang="en-CA" dirty="0"/>
+              <a:t>Exit state prob based on entrance </a:t>
+            </a:r>
+            <a:r>
+              <a:rPr lang="en-CA" dirty="0" err="1"/>
+              <a:t>i</a:t>
+            </a:r>
+            <a:r>
+              <a:rPr lang="en-CA" dirty="0"/>
+              <a:t> (AHS)</a:t>
+            </a:r>
+          </a:p>
+        </p:txBody>
+      </p:sp>
+      <p:pic>
+        <p:nvPicPr>
+          <p:cNvPr id="10" name="Picture 9">
+            <a:extLst>
+              <a:ext uri="{FF2B5EF4-FFF2-40B4-BE49-F238E27FC236}">
+                <a16:creationId xmlns:a16="http://schemas.microsoft.com/office/drawing/2014/main" id="{321CFDF1-C480-4DA3-832A-03F9EABBA8D7}"/>
+              </a:ext>
+            </a:extLst>
+          </p:cNvPr>
+          <p:cNvPicPr>
+            <a:picLocks noChangeAspect="1"/>
+          </p:cNvPicPr>
+          <p:nvPr/>
+        </p:nvPicPr>
+        <p:blipFill>
+          <a:blip r:embed="rId3"/>
+          <a:stretch>
+            <a:fillRect/>
+          </a:stretch>
+        </p:blipFill>
+        <p:spPr>
+          <a:xfrm>
+            <a:off x="5882513" y="2183336"/>
+            <a:ext cx="1733550" cy="2628900"/>
+          </a:xfrm>
+          <a:prstGeom prst="rect">
+            <a:avLst/>
+          </a:prstGeom>
+        </p:spPr>
+      </p:pic>
+      <p:sp>
+        <p:nvSpPr>
+          <p:cNvPr id="11" name="TextBox 10">
+            <a:extLst>
+              <a:ext uri="{FF2B5EF4-FFF2-40B4-BE49-F238E27FC236}">
+                <a16:creationId xmlns:a16="http://schemas.microsoft.com/office/drawing/2014/main" id="{76E772B0-D414-40EF-8E17-341A22784B98}"/>
+              </a:ext>
+            </a:extLst>
+          </p:cNvPr>
+          <p:cNvSpPr txBox="1"/>
+          <p:nvPr/>
+        </p:nvSpPr>
+        <p:spPr>
+          <a:xfrm>
+            <a:off x="6096000" y="1619792"/>
+            <a:ext cx="1407950" cy="369332"/>
+          </a:xfrm>
+          <a:prstGeom prst="rect">
+            <a:avLst/>
+          </a:prstGeom>
+          <a:noFill/>
+        </p:spPr>
+        <p:txBody>
+          <a:bodyPr wrap="none" rtlCol="0">
+            <a:spAutoFit/>
+          </a:bodyPr>
+          <a:lstStyle/>
+          <a:p>
+            <a:r>
+              <a:rPr lang="en-CA" dirty="0"/>
+              <a:t>No threshold</a:t>
+            </a:r>
+          </a:p>
+        </p:txBody>
+      </p:sp>
+      <p:sp>
+        <p:nvSpPr>
+          <p:cNvPr id="12" name="TextBox 11">
+            <a:extLst>
+              <a:ext uri="{FF2B5EF4-FFF2-40B4-BE49-F238E27FC236}">
+                <a16:creationId xmlns:a16="http://schemas.microsoft.com/office/drawing/2014/main" id="{0FC10C75-47E6-4E50-BB9F-7DD105F284D0}"/>
+              </a:ext>
+            </a:extLst>
+          </p:cNvPr>
+          <p:cNvSpPr txBox="1"/>
+          <p:nvPr/>
+        </p:nvSpPr>
+        <p:spPr>
+          <a:xfrm>
+            <a:off x="5898558" y="1882196"/>
+            <a:ext cx="729174" cy="369332"/>
+          </a:xfrm>
+          <a:prstGeom prst="rect">
+            <a:avLst/>
+          </a:prstGeom>
+          <a:noFill/>
+        </p:spPr>
+        <p:txBody>
+          <a:bodyPr wrap="none" rtlCol="0">
+            <a:spAutoFit/>
+          </a:bodyPr>
+          <a:lstStyle/>
+          <a:p>
+            <a:r>
+              <a:rPr lang="en-CA" dirty="0"/>
+              <a:t>death</a:t>
+            </a:r>
+          </a:p>
+        </p:txBody>
+      </p:sp>
+      <p:sp>
+        <p:nvSpPr>
+          <p:cNvPr id="13" name="TextBox 12">
+            <a:extLst>
+              <a:ext uri="{FF2B5EF4-FFF2-40B4-BE49-F238E27FC236}">
+                <a16:creationId xmlns:a16="http://schemas.microsoft.com/office/drawing/2014/main" id="{5F94975C-B2D2-49A6-B915-5736C03B1C00}"/>
+              </a:ext>
+            </a:extLst>
+          </p:cNvPr>
+          <p:cNvSpPr txBox="1"/>
+          <p:nvPr/>
+        </p:nvSpPr>
+        <p:spPr>
+          <a:xfrm>
+            <a:off x="6589135" y="1900738"/>
+            <a:ext cx="1141210" cy="369332"/>
+          </a:xfrm>
+          <a:prstGeom prst="rect">
+            <a:avLst/>
+          </a:prstGeom>
+          <a:noFill/>
+        </p:spPr>
+        <p:txBody>
+          <a:bodyPr wrap="none" rtlCol="0">
+            <a:spAutoFit/>
+          </a:bodyPr>
+          <a:lstStyle/>
+          <a:p>
+            <a:r>
+              <a:rPr lang="en-CA" dirty="0"/>
+              <a:t>transplant</a:t>
+            </a:r>
+          </a:p>
+        </p:txBody>
+      </p:sp>
+      <p:sp>
+        <p:nvSpPr>
+          <p:cNvPr id="14" name="TextBox 13">
+            <a:extLst>
+              <a:ext uri="{FF2B5EF4-FFF2-40B4-BE49-F238E27FC236}">
+                <a16:creationId xmlns:a16="http://schemas.microsoft.com/office/drawing/2014/main" id="{5265E7FF-4F6F-4FA5-94D3-F976F236F9B9}"/>
+              </a:ext>
+            </a:extLst>
+          </p:cNvPr>
+          <p:cNvSpPr txBox="1"/>
+          <p:nvPr/>
+        </p:nvSpPr>
+        <p:spPr>
+          <a:xfrm>
+            <a:off x="5286674" y="943315"/>
+            <a:ext cx="881844" cy="369332"/>
+          </a:xfrm>
+          <a:prstGeom prst="rect">
+            <a:avLst/>
+          </a:prstGeom>
+          <a:noFill/>
+        </p:spPr>
+        <p:txBody>
+          <a:bodyPr wrap="none" rtlCol="0">
+            <a:spAutoFit/>
+          </a:bodyPr>
+          <a:lstStyle/>
+          <a:p>
+            <a:r>
+              <a:rPr lang="en-CA" dirty="0"/>
+              <a:t>Part (b)</a:t>
+            </a:r>
+          </a:p>
+        </p:txBody>
+      </p:sp>
+      <p:sp>
+        <p:nvSpPr>
+          <p:cNvPr id="15" name="TextBox 14">
+            <a:extLst>
+              <a:ext uri="{FF2B5EF4-FFF2-40B4-BE49-F238E27FC236}">
+                <a16:creationId xmlns:a16="http://schemas.microsoft.com/office/drawing/2014/main" id="{E81A6625-70BC-4B77-AB39-6EB30ED04C4A}"/>
+              </a:ext>
+            </a:extLst>
+          </p:cNvPr>
+          <p:cNvSpPr txBox="1"/>
+          <p:nvPr/>
+        </p:nvSpPr>
+        <p:spPr>
+          <a:xfrm>
+            <a:off x="4486197" y="4856359"/>
+            <a:ext cx="1813189" cy="369332"/>
+          </a:xfrm>
+          <a:prstGeom prst="rect">
+            <a:avLst/>
+          </a:prstGeom>
+          <a:noFill/>
+        </p:spPr>
+        <p:txBody>
+          <a:bodyPr wrap="none" rtlCol="0">
+            <a:spAutoFit/>
+          </a:bodyPr>
+          <a:lstStyle/>
+          <a:p>
+            <a:r>
+              <a:rPr lang="en-CA" dirty="0"/>
+              <a:t>From: [I-Q]</a:t>
+            </a:r>
+            <a:r>
+              <a:rPr lang="en-CA" baseline="30000" dirty="0"/>
+              <a:t>-1</a:t>
+            </a:r>
+            <a:r>
+              <a:rPr lang="en-CA" dirty="0"/>
+              <a:t> x [R]</a:t>
+            </a:r>
+          </a:p>
+        </p:txBody>
+      </p:sp>
+    </p:spTree>
+    <p:extLst>
+      <p:ext uri="{BB962C8B-B14F-4D97-AF65-F5344CB8AC3E}">
+        <p14:creationId xmlns:p14="http://schemas.microsoft.com/office/powerpoint/2010/main" val="3794707611"/>
       </p:ext>
     </p:extLst>
   </p:cSld>

</xml_diff>